<commit_message>
Updated slides with URLs
</commit_message>
<xml_diff>
--- a/Workshop.pptx
+++ b/Workshop.pptx
@@ -138,6 +138,9 @@
         </p14:section>
       </p14:sectionLst>
     </p:ext>
+    <p:ext uri="{EFAFB233-063F-42B5-8137-9DF3F51BA10A}">
+      <p15:sldGuideLst xmlns:p15="http://schemas.microsoft.com/office/powerpoint/2012/main"/>
+    </p:ext>
   </p:extLst>
 </p:presentation>
 </file>
@@ -187,7 +190,6 @@
               <a:rPr lang="nl-NL"/>
               <a:t>Klik om de stijl te bewerken</a:t>
             </a:r>
-            <a:endParaRPr lang="nl-NL"/>
           </a:p>
         </p:txBody>
       </p:sp>
@@ -252,7 +254,6 @@
               <a:rPr lang="nl-NL"/>
               <a:t>Klik om de ondertitelstijl van het model te bewerken</a:t>
             </a:r>
-            <a:endParaRPr lang="nl-NL"/>
           </a:p>
         </p:txBody>
       </p:sp>
@@ -273,7 +274,7 @@
           <a:p>
             <a:fld id="{97720C9E-040C-4E78-AB4A-756C6907FB5D}" type="datetimeFigureOut">
               <a:rPr lang="nl-NL" smtClean="0"/>
-              <a:t>13-12-2016</a:t>
+              <a:t>14-12-2016</a:t>
             </a:fld>
             <a:endParaRPr lang="nl-NL"/>
           </a:p>
@@ -370,7 +371,6 @@
               <a:rPr lang="nl-NL"/>
               <a:t>Klik om de stijl te bewerken</a:t>
             </a:r>
-            <a:endParaRPr lang="nl-NL"/>
           </a:p>
         </p:txBody>
       </p:sp>
@@ -422,7 +422,6 @@
               <a:rPr lang="nl-NL"/>
               <a:t>Vijfde niveau</a:t>
             </a:r>
-            <a:endParaRPr lang="nl-NL"/>
           </a:p>
         </p:txBody>
       </p:sp>
@@ -443,7 +442,7 @@
           <a:p>
             <a:fld id="{97720C9E-040C-4E78-AB4A-756C6907FB5D}" type="datetimeFigureOut">
               <a:rPr lang="nl-NL" smtClean="0"/>
-              <a:t>13-12-2016</a:t>
+              <a:t>14-12-2016</a:t>
             </a:fld>
             <a:endParaRPr lang="nl-NL"/>
           </a:p>
@@ -545,7 +544,6 @@
               <a:rPr lang="nl-NL"/>
               <a:t>Klik om de stijl te bewerken</a:t>
             </a:r>
-            <a:endParaRPr lang="nl-NL"/>
           </a:p>
         </p:txBody>
       </p:sp>
@@ -602,7 +600,6 @@
               <a:rPr lang="nl-NL"/>
               <a:t>Vijfde niveau</a:t>
             </a:r>
-            <a:endParaRPr lang="nl-NL"/>
           </a:p>
         </p:txBody>
       </p:sp>
@@ -623,7 +620,7 @@
           <a:p>
             <a:fld id="{97720C9E-040C-4E78-AB4A-756C6907FB5D}" type="datetimeFigureOut">
               <a:rPr lang="nl-NL" smtClean="0"/>
-              <a:t>13-12-2016</a:t>
+              <a:t>14-12-2016</a:t>
             </a:fld>
             <a:endParaRPr lang="nl-NL"/>
           </a:p>
@@ -720,7 +717,6 @@
               <a:rPr lang="nl-NL"/>
               <a:t>Klik om de stijl te bewerken</a:t>
             </a:r>
-            <a:endParaRPr lang="nl-NL"/>
           </a:p>
         </p:txBody>
       </p:sp>
@@ -772,7 +768,6 @@
               <a:rPr lang="nl-NL"/>
               <a:t>Vijfde niveau</a:t>
             </a:r>
-            <a:endParaRPr lang="nl-NL"/>
           </a:p>
         </p:txBody>
       </p:sp>
@@ -793,7 +788,7 @@
           <a:p>
             <a:fld id="{97720C9E-040C-4E78-AB4A-756C6907FB5D}" type="datetimeFigureOut">
               <a:rPr lang="nl-NL" smtClean="0"/>
-              <a:t>13-12-2016</a:t>
+              <a:t>14-12-2016</a:t>
             </a:fld>
             <a:endParaRPr lang="nl-NL"/>
           </a:p>
@@ -899,7 +894,6 @@
               <a:rPr lang="nl-NL"/>
               <a:t>Klik om de stijl te bewerken</a:t>
             </a:r>
-            <a:endParaRPr lang="nl-NL"/>
           </a:p>
         </p:txBody>
       </p:sp>
@@ -1039,7 +1033,7 @@
           <a:p>
             <a:fld id="{97720C9E-040C-4E78-AB4A-756C6907FB5D}" type="datetimeFigureOut">
               <a:rPr lang="nl-NL" smtClean="0"/>
-              <a:t>13-12-2016</a:t>
+              <a:t>14-12-2016</a:t>
             </a:fld>
             <a:endParaRPr lang="nl-NL"/>
           </a:p>
@@ -1136,7 +1130,6 @@
               <a:rPr lang="nl-NL"/>
               <a:t>Klik om de stijl te bewerken</a:t>
             </a:r>
-            <a:endParaRPr lang="nl-NL"/>
           </a:p>
         </p:txBody>
       </p:sp>
@@ -1193,7 +1186,6 @@
               <a:rPr lang="nl-NL"/>
               <a:t>Vijfde niveau</a:t>
             </a:r>
-            <a:endParaRPr lang="nl-NL"/>
           </a:p>
         </p:txBody>
       </p:sp>
@@ -1250,7 +1242,6 @@
               <a:rPr lang="nl-NL"/>
               <a:t>Vijfde niveau</a:t>
             </a:r>
-            <a:endParaRPr lang="nl-NL"/>
           </a:p>
         </p:txBody>
       </p:sp>
@@ -1271,7 +1262,7 @@
           <a:p>
             <a:fld id="{97720C9E-040C-4E78-AB4A-756C6907FB5D}" type="datetimeFigureOut">
               <a:rPr lang="nl-NL" smtClean="0"/>
-              <a:t>13-12-2016</a:t>
+              <a:t>14-12-2016</a:t>
             </a:fld>
             <a:endParaRPr lang="nl-NL"/>
           </a:p>
@@ -1373,7 +1364,6 @@
               <a:rPr lang="nl-NL"/>
               <a:t>Klik om de stijl te bewerken</a:t>
             </a:r>
-            <a:endParaRPr lang="nl-NL"/>
           </a:p>
         </p:txBody>
       </p:sp>
@@ -1495,7 +1485,6 @@
               <a:rPr lang="nl-NL"/>
               <a:t>Vijfde niveau</a:t>
             </a:r>
-            <a:endParaRPr lang="nl-NL"/>
           </a:p>
         </p:txBody>
       </p:sp>
@@ -1617,7 +1606,6 @@
               <a:rPr lang="nl-NL"/>
               <a:t>Vijfde niveau</a:t>
             </a:r>
-            <a:endParaRPr lang="nl-NL"/>
           </a:p>
         </p:txBody>
       </p:sp>
@@ -1638,7 +1626,7 @@
           <a:p>
             <a:fld id="{97720C9E-040C-4E78-AB4A-756C6907FB5D}" type="datetimeFigureOut">
               <a:rPr lang="nl-NL" smtClean="0"/>
-              <a:t>13-12-2016</a:t>
+              <a:t>14-12-2016</a:t>
             </a:fld>
             <a:endParaRPr lang="nl-NL"/>
           </a:p>
@@ -1735,7 +1723,6 @@
               <a:rPr lang="nl-NL"/>
               <a:t>Klik om de stijl te bewerken</a:t>
             </a:r>
-            <a:endParaRPr lang="nl-NL"/>
           </a:p>
         </p:txBody>
       </p:sp>
@@ -1756,7 +1743,7 @@
           <a:p>
             <a:fld id="{97720C9E-040C-4E78-AB4A-756C6907FB5D}" type="datetimeFigureOut">
               <a:rPr lang="nl-NL" smtClean="0"/>
-              <a:t>13-12-2016</a:t>
+              <a:t>14-12-2016</a:t>
             </a:fld>
             <a:endParaRPr lang="nl-NL"/>
           </a:p>
@@ -1851,7 +1838,7 @@
           <a:p>
             <a:fld id="{97720C9E-040C-4E78-AB4A-756C6907FB5D}" type="datetimeFigureOut">
               <a:rPr lang="nl-NL" smtClean="0"/>
-              <a:t>13-12-2016</a:t>
+              <a:t>14-12-2016</a:t>
             </a:fld>
             <a:endParaRPr lang="nl-NL"/>
           </a:p>
@@ -1957,7 +1944,6 @@
               <a:rPr lang="nl-NL"/>
               <a:t>Klik om de stijl te bewerken</a:t>
             </a:r>
-            <a:endParaRPr lang="nl-NL"/>
           </a:p>
         </p:txBody>
       </p:sp>
@@ -2042,7 +2028,6 @@
               <a:rPr lang="nl-NL"/>
               <a:t>Vijfde niveau</a:t>
             </a:r>
-            <a:endParaRPr lang="nl-NL"/>
           </a:p>
         </p:txBody>
       </p:sp>
@@ -2128,7 +2113,7 @@
           <a:p>
             <a:fld id="{97720C9E-040C-4E78-AB4A-756C6907FB5D}" type="datetimeFigureOut">
               <a:rPr lang="nl-NL" smtClean="0"/>
-              <a:t>13-12-2016</a:t>
+              <a:t>14-12-2016</a:t>
             </a:fld>
             <a:endParaRPr lang="nl-NL"/>
           </a:p>
@@ -2234,7 +2219,6 @@
               <a:rPr lang="nl-NL"/>
               <a:t>Klik om de stijl te bewerken</a:t>
             </a:r>
-            <a:endParaRPr lang="nl-NL"/>
           </a:p>
         </p:txBody>
       </p:sp>
@@ -2381,7 +2365,7 @@
           <a:p>
             <a:fld id="{97720C9E-040C-4E78-AB4A-756C6907FB5D}" type="datetimeFigureOut">
               <a:rPr lang="nl-NL" smtClean="0"/>
-              <a:t>13-12-2016</a:t>
+              <a:t>14-12-2016</a:t>
             </a:fld>
             <a:endParaRPr lang="nl-NL"/>
           </a:p>
@@ -2493,7 +2477,6 @@
               <a:rPr lang="nl-NL"/>
               <a:t>Klik om de stijl te bewerken</a:t>
             </a:r>
-            <a:endParaRPr lang="nl-NL"/>
           </a:p>
         </p:txBody>
       </p:sp>
@@ -2555,7 +2538,6 @@
               <a:rPr lang="nl-NL"/>
               <a:t>Vijfde niveau</a:t>
             </a:r>
-            <a:endParaRPr lang="nl-NL"/>
           </a:p>
         </p:txBody>
       </p:sp>
@@ -2594,7 +2576,7 @@
           <a:p>
             <a:fld id="{97720C9E-040C-4E78-AB4A-756C6907FB5D}" type="datetimeFigureOut">
               <a:rPr lang="nl-NL" smtClean="0"/>
-              <a:t>13-12-2016</a:t>
+              <a:t>14-12-2016</a:t>
             </a:fld>
             <a:endParaRPr lang="nl-NL"/>
           </a:p>
@@ -4011,29 +3993,11 @@
           <a:lstStyle/>
           <a:p>
             <a:r>
-              <a:rPr lang="en-US" dirty="0"/>
-              <a:t>TODOTODOTODOTODO</a:t>
-            </a:r>
-            <a:r>
-              <a:rPr lang="en-US" dirty="0"/>
-              <a:t>TODOTODOTODOTODOTODOTODOTODO</a:t>
-            </a:r>
-          </a:p>
-          <a:p>
-            <a:r>
-              <a:rPr lang="en-US" dirty="0"/>
-              <a:t>Actually upload stuff so people can download it you dingus</a:t>
-            </a:r>
-            <a:endParaRPr lang="nl-NL" dirty="0"/>
-          </a:p>
-          <a:p>
-            <a:r>
-              <a:rPr lang="en-US" dirty="0"/>
-              <a:t>TODOTODOTODOTODOTODOTODOTODOTODOTODOTODOTODO</a:t>
-            </a:r>
-            <a:endParaRPr lang="nl-NL" dirty="0"/>
-          </a:p>
-          <a:p>
+              <a:rPr lang="en-US" dirty="0">
+                <a:hlinkClick r:id="rId2"/>
+              </a:rPr>
+              <a:t>https://github.com/RickvanMiltenburg/vktut</a:t>
+            </a:r>
             <a:endParaRPr lang="nl-NL" dirty="0"/>
           </a:p>
         </p:txBody>

</xml_diff>